<commit_message>
upload building example - PyAPDL version
</commit_message>
<xml_diff>
--- a/Building_info/sensor_map.pptx
+++ b/Building_info/sensor_map.pptx
@@ -307,7 +307,7 @@
               <a:pPr>
                 <a:defRPr/>
               </a:pPr>
-              <a:t>04/10/2024</a:t>
+              <a:t>14/10/2024</a:t>
             </a:fld>
             <a:endParaRPr lang="en-GB" dirty="0"/>
           </a:p>
@@ -526,7 +526,7 @@
               <a:pPr>
                 <a:defRPr/>
               </a:pPr>
-              <a:t>04/10/2024</a:t>
+              <a:t>14/10/2024</a:t>
             </a:fld>
             <a:endParaRPr lang="en-GB"/>
           </a:p>

</xml_diff>

<commit_message>
upload pymapdl files and further analysis used files
</commit_message>
<xml_diff>
--- a/Building_info/sensor_map.pptx
+++ b/Building_info/sensor_map.pptx
@@ -10,10 +10,10 @@
     <p:sldMasterId id="2147483697" r:id="rId6"/>
   </p:sldMasterIdLst>
   <p:notesMasterIdLst>
-    <p:notesMasterId r:id="rId23"/>
+    <p:notesMasterId r:id="rId24"/>
   </p:notesMasterIdLst>
   <p:handoutMasterIdLst>
-    <p:handoutMasterId r:id="rId24"/>
+    <p:handoutMasterId r:id="rId25"/>
   </p:handoutMasterIdLst>
   <p:sldIdLst>
     <p:sldId id="355" r:id="rId7"/>
@@ -32,6 +32,7 @@
     <p:sldId id="370" r:id="rId20"/>
     <p:sldId id="371" r:id="rId21"/>
     <p:sldId id="369" r:id="rId22"/>
+    <p:sldId id="372" r:id="rId23"/>
   </p:sldIdLst>
   <p:sldSz cx="9144000" cy="5143500" type="screen16x9"/>
   <p:notesSz cx="9925050" cy="6665913"/>
@@ -307,7 +308,7 @@
               <a:pPr>
                 <a:defRPr/>
               </a:pPr>
-              <a:t>14/10/2024</a:t>
+              <a:t>18/11/2024</a:t>
             </a:fld>
             <a:endParaRPr lang="en-GB" dirty="0"/>
           </a:p>
@@ -526,7 +527,7 @@
               <a:pPr>
                 <a:defRPr/>
               </a:pPr>
-              <a:t>14/10/2024</a:t>
+              <a:t>18/11/2024</a:t>
             </a:fld>
             <a:endParaRPr lang="en-GB"/>
           </a:p>
@@ -9394,6 +9395,233 @@
     <p:extLst>
       <p:ext uri="{BB962C8B-B14F-4D97-AF65-F5344CB8AC3E}">
         <p14:creationId xmlns:p14="http://schemas.microsoft.com/office/powerpoint/2010/main" val="3554178541"/>
+      </p:ext>
+    </p:extLst>
+  </p:cSld>
+  <p:clrMapOvr>
+    <a:masterClrMapping/>
+  </p:clrMapOvr>
+</p:sld>
+</file>
+
+<file path=ppt/slides/slide17.xml><?xml version="1.0" encoding="utf-8"?>
+<p:sld xmlns:a="http://schemas.openxmlformats.org/drawingml/2006/main" xmlns:r="http://schemas.openxmlformats.org/officeDocument/2006/relationships" xmlns:p="http://schemas.openxmlformats.org/presentationml/2006/main">
+  <p:cSld>
+    <p:spTree>
+      <p:nvGrpSpPr>
+        <p:cNvPr id="1" name=""/>
+        <p:cNvGrpSpPr/>
+        <p:nvPr/>
+      </p:nvGrpSpPr>
+      <p:grpSpPr>
+        <a:xfrm>
+          <a:off x="0" y="0"/>
+          <a:ext cx="0" cy="0"/>
+          <a:chOff x="0" y="0"/>
+          <a:chExt cx="0" cy="0"/>
+        </a:xfrm>
+      </p:grpSpPr>
+      <p:sp>
+        <p:nvSpPr>
+          <p:cNvPr id="2" name="Title 1">
+            <a:extLst>
+              <a:ext uri="{FF2B5EF4-FFF2-40B4-BE49-F238E27FC236}">
+                <a16:creationId xmlns:a16="http://schemas.microsoft.com/office/drawing/2014/main" id="{FE6A099C-8DB0-0D0C-CF3B-730E1B443E8F}"/>
+              </a:ext>
+            </a:extLst>
+          </p:cNvPr>
+          <p:cNvSpPr>
+            <a:spLocks noGrp="1"/>
+          </p:cNvSpPr>
+          <p:nvPr>
+            <p:ph type="title"/>
+          </p:nvPr>
+        </p:nvSpPr>
+        <p:spPr>
+          <a:xfrm>
+            <a:off x="319090" y="972000"/>
+            <a:ext cx="8508999" cy="380810"/>
+          </a:xfrm>
+        </p:spPr>
+        <p:txBody>
+          <a:bodyPr/>
+          <a:lstStyle/>
+          <a:p>
+            <a:r>
+              <a:rPr lang="en-US" dirty="0">
+                <a:solidFill>
+                  <a:schemeClr val="tx1"/>
+                </a:solidFill>
+              </a:rPr>
+              <a:t>Sensitivity based FEMU: </a:t>
+            </a:r>
+          </a:p>
+        </p:txBody>
+      </p:sp>
+      <p:sp>
+        <p:nvSpPr>
+          <p:cNvPr id="3" name="Slide Number Placeholder 2">
+            <a:extLst>
+              <a:ext uri="{FF2B5EF4-FFF2-40B4-BE49-F238E27FC236}">
+                <a16:creationId xmlns:a16="http://schemas.microsoft.com/office/drawing/2014/main" id="{58AECDB0-8A2C-D571-09DE-95FA0DCC773A}"/>
+              </a:ext>
+            </a:extLst>
+          </p:cNvPr>
+          <p:cNvSpPr>
+            <a:spLocks noGrp="1"/>
+          </p:cNvSpPr>
+          <p:nvPr>
+            <p:ph type="sldNum" sz="quarter" idx="11"/>
+          </p:nvPr>
+        </p:nvSpPr>
+        <p:spPr/>
+        <p:txBody>
+          <a:bodyPr/>
+          <a:lstStyle/>
+          <a:p>
+            <a:fld id="{CE58CB1E-F828-4F11-99E0-327109AF9DA4}" type="slidenum">
+              <a:rPr lang="de-DE" smtClean="0"/>
+              <a:pPr/>
+              <a:t>17</a:t>
+            </a:fld>
+            <a:endParaRPr lang="de-DE" dirty="0"/>
+          </a:p>
+        </p:txBody>
+      </p:sp>
+      <p:sp>
+        <p:nvSpPr>
+          <p:cNvPr id="4" name="Footer Placeholder 3">
+            <a:extLst>
+              <a:ext uri="{FF2B5EF4-FFF2-40B4-BE49-F238E27FC236}">
+                <a16:creationId xmlns:a16="http://schemas.microsoft.com/office/drawing/2014/main" id="{E2BB6275-E675-D4F4-8F85-CA5105D7ECDB}"/>
+              </a:ext>
+            </a:extLst>
+          </p:cNvPr>
+          <p:cNvSpPr>
+            <a:spLocks noGrp="1"/>
+          </p:cNvSpPr>
+          <p:nvPr>
+            <p:ph type="ftr" sz="quarter" idx="12"/>
+          </p:nvPr>
+        </p:nvSpPr>
+        <p:spPr/>
+        <p:txBody>
+          <a:bodyPr/>
+          <a:lstStyle/>
+          <a:p>
+            <a:r>
+              <a:rPr lang="de-DE"/>
+              <a:t>Dr. rer. nat. Erika Mustermann (TUM) | kann beliebig erweitert werden | Infos mit Strich trennen</a:t>
+            </a:r>
+            <a:endParaRPr lang="en-US" dirty="0"/>
+          </a:p>
+        </p:txBody>
+      </p:sp>
+      <p:sp>
+        <p:nvSpPr>
+          <p:cNvPr id="5" name="TextBox 4">
+            <a:extLst>
+              <a:ext uri="{FF2B5EF4-FFF2-40B4-BE49-F238E27FC236}">
+                <a16:creationId xmlns:a16="http://schemas.microsoft.com/office/drawing/2014/main" id="{76E0DC53-74DC-2247-83B5-92D759EFD187}"/>
+              </a:ext>
+            </a:extLst>
+          </p:cNvPr>
+          <p:cNvSpPr txBox="1"/>
+          <p:nvPr/>
+        </p:nvSpPr>
+        <p:spPr>
+          <a:xfrm>
+            <a:off x="461108" y="1727200"/>
+            <a:ext cx="8365826" cy="1392432"/>
+          </a:xfrm>
+          <a:prstGeom prst="rect">
+            <a:avLst/>
+          </a:prstGeom>
+          <a:noFill/>
+        </p:spPr>
+        <p:txBody>
+          <a:bodyPr wrap="square" lIns="0" tIns="0" rIns="0" bIns="0" rtlCol="0">
+            <a:spAutoFit/>
+          </a:bodyPr>
+          <a:lstStyle/>
+          <a:p>
+            <a:pPr>
+              <a:lnSpc>
+                <a:spcPct val="114000"/>
+              </a:lnSpc>
+            </a:pPr>
+            <a:r>
+              <a:rPr lang="en-US" sz="1600" dirty="0">
+                <a:latin typeface="+mn-lt"/>
+              </a:rPr>
+              <a:t>Not working, due to an underdetermined system</a:t>
+            </a:r>
+          </a:p>
+          <a:p>
+            <a:pPr>
+              <a:lnSpc>
+                <a:spcPct val="114000"/>
+              </a:lnSpc>
+            </a:pPr>
+            <a:endParaRPr lang="en-US" sz="1600" dirty="0">
+              <a:latin typeface="+mn-lt"/>
+            </a:endParaRPr>
+          </a:p>
+          <a:p>
+            <a:pPr algn="l"/>
+            <a:r>
+              <a:rPr lang="en-US" sz="1600" dirty="0">
+                <a:latin typeface="+mn-lt"/>
+              </a:rPr>
+              <a:t>[1]: </a:t>
+            </a:r>
+            <a:r>
+              <a:rPr lang="en-US" sz="1800" b="0" i="0" u="none" strike="noStrike" baseline="0" dirty="0">
+                <a:latin typeface="OpenSans-Semibold"/>
+              </a:rPr>
+              <a:t>Improved finite element model updating of a </a:t>
+            </a:r>
+            <a:r>
+              <a:rPr lang="en-US" sz="1800" b="0" i="0" u="none" strike="noStrike" baseline="0" dirty="0" err="1">
+                <a:latin typeface="OpenSans-Semibold"/>
+              </a:rPr>
+              <a:t>fullscale</a:t>
+            </a:r>
+            <a:r>
+              <a:rPr lang="en-US" dirty="0">
+                <a:latin typeface="OpenSans-Semibold"/>
+              </a:rPr>
+              <a:t> </a:t>
+            </a:r>
+            <a:r>
+              <a:rPr lang="en-US" sz="1800" b="0" i="0" u="none" strike="noStrike" baseline="0" dirty="0">
+                <a:latin typeface="OpenSans-Semibold"/>
+              </a:rPr>
+              <a:t>steel bridge using sensitivity analysis</a:t>
+            </a:r>
+          </a:p>
+          <a:p>
+            <a:pPr algn="l"/>
+            <a:r>
+              <a:rPr lang="en-US" dirty="0">
+                <a:latin typeface="OpenSans-Semibold"/>
+              </a:rPr>
+              <a:t>[2]: </a:t>
+            </a:r>
+            <a:r>
+              <a:rPr lang="en-US" sz="1600" dirty="0"/>
+              <a:t>The sensitivity method in finite element model updating: A tutorial</a:t>
+            </a:r>
+            <a:endParaRPr lang="en-US" sz="1600" dirty="0">
+              <a:latin typeface="+mn-lt"/>
+            </a:endParaRPr>
+          </a:p>
+        </p:txBody>
+      </p:sp>
+    </p:spTree>
+    <p:extLst>
+      <p:ext uri="{BB962C8B-B14F-4D97-AF65-F5344CB8AC3E}">
+        <p14:creationId xmlns:p14="http://schemas.microsoft.com/office/powerpoint/2010/main" val="2502564838"/>
       </p:ext>
     </p:extLst>
   </p:cSld>

</xml_diff>